<commit_message>
adding to example boost test framework
</commit_message>
<xml_diff>
--- a/lections/cpp_craft_lec_7_pre.pptx
+++ b/lections/cpp_craft_lec_7_pre.pptx
@@ -532,7 +532,7 @@
     </p:spTree>
     <p:extLst>
       <p:ext uri="{BB962C8B-B14F-4D97-AF65-F5344CB8AC3E}">
-        <p14:creationId xmlns:p14="http://schemas.microsoft.com/office/powerpoint/2010/main" xmlns="" val="402960394"/>
+        <p14:creationId xmlns="" xmlns:p14="http://schemas.microsoft.com/office/powerpoint/2010/main" val="402960394"/>
       </p:ext>
     </p:extLst>
   </p:cSld>
@@ -710,7 +710,7 @@
     </p:spTree>
     <p:extLst>
       <p:ext uri="{BB962C8B-B14F-4D97-AF65-F5344CB8AC3E}">
-        <p14:creationId xmlns:p14="http://schemas.microsoft.com/office/powerpoint/2010/main" xmlns="" val="1596205665"/>
+        <p14:creationId xmlns="" xmlns:p14="http://schemas.microsoft.com/office/powerpoint/2010/main" val="1596205665"/>
       </p:ext>
     </p:extLst>
   </p:cSld>
@@ -3693,11 +3693,7 @@
             </a:r>
             <a:r>
               <a:rPr lang="en-US" dirty="0" smtClean="0"/>
-              <a:t>Craft: </a:t>
-            </a:r>
-            <a:r>
-              <a:rPr lang="en-US" dirty="0" smtClean="0"/>
-              <a:t>#7</a:t>
+              <a:t>Craft: #7</a:t>
             </a:r>
             <a:endParaRPr lang="en-US" dirty="0"/>
           </a:p>
@@ -3742,7 +3738,6 @@
               <a:rPr lang="ru-RU" dirty="0" smtClean="0"/>
               <a:t>Балансировка нагрузки</a:t>
             </a:r>
-            <a:endParaRPr lang="ru-RU" dirty="0" smtClean="0"/>
           </a:p>
         </p:txBody>
       </p:sp>
@@ -3849,10 +3844,6 @@
               </a:rPr>
               <a:t>#define _CRTDBG_MAP_ALLOC </a:t>
             </a:r>
-            <a:endParaRPr lang="en-US" sz="2000" dirty="0" smtClean="0">
-              <a:latin typeface="Consolas" pitchFamily="49" charset="0"/>
-              <a:cs typeface="Consolas" pitchFamily="49" charset="0"/>
-            </a:endParaRPr>
           </a:p>
           <a:p>
             <a:r>
@@ -3860,14 +3851,7 @@
                 <a:latin typeface="Consolas" pitchFamily="49" charset="0"/>
                 <a:cs typeface="Consolas" pitchFamily="49" charset="0"/>
               </a:rPr>
-              <a:t>#</a:t>
-            </a:r>
-            <a:r>
-              <a:rPr lang="en-US" sz="2000" dirty="0" smtClean="0">
-                <a:latin typeface="Consolas" pitchFamily="49" charset="0"/>
-                <a:cs typeface="Consolas" pitchFamily="49" charset="0"/>
-              </a:rPr>
-              <a:t>include &lt;</a:t>
+              <a:t>#include &lt;</a:t>
             </a:r>
             <a:r>
               <a:rPr lang="en-US" sz="2000" dirty="0" err="1" smtClean="0">
@@ -3883,10 +3867,6 @@
               </a:rPr>
               <a:t>&gt; </a:t>
             </a:r>
-            <a:endParaRPr lang="en-US" sz="2000" dirty="0" smtClean="0">
-              <a:latin typeface="Consolas" pitchFamily="49" charset="0"/>
-              <a:cs typeface="Consolas" pitchFamily="49" charset="0"/>
-            </a:endParaRPr>
           </a:p>
           <a:p>
             <a:r>
@@ -3894,14 +3874,7 @@
                 <a:latin typeface="Consolas" pitchFamily="49" charset="0"/>
                 <a:cs typeface="Consolas" pitchFamily="49" charset="0"/>
               </a:rPr>
-              <a:t>#</a:t>
-            </a:r>
-            <a:r>
-              <a:rPr lang="en-US" sz="2000" dirty="0" smtClean="0">
-                <a:latin typeface="Consolas" pitchFamily="49" charset="0"/>
-                <a:cs typeface="Consolas" pitchFamily="49" charset="0"/>
-              </a:rPr>
-              <a:t>include &lt;</a:t>
+              <a:t>#include &lt;</a:t>
             </a:r>
             <a:r>
               <a:rPr lang="en-US" sz="2000" dirty="0" err="1" smtClean="0">
@@ -3978,21 +3951,7 @@
                 <a:latin typeface="Consolas" pitchFamily="49" charset="0"/>
                 <a:cs typeface="Consolas" pitchFamily="49" charset="0"/>
               </a:rPr>
-              <a:t> ( _</a:t>
-            </a:r>
-            <a:r>
-              <a:rPr lang="en-US" sz="2000" dirty="0" smtClean="0">
-                <a:latin typeface="Consolas" pitchFamily="49" charset="0"/>
-                <a:cs typeface="Consolas" pitchFamily="49" charset="0"/>
-              </a:rPr>
-              <a:t>CRTDBG_ALLOC_MEM_DF | 			_CRTDBG_LEAK_CHECK_DF </a:t>
-            </a:r>
-            <a:r>
-              <a:rPr lang="en-US" sz="2000" dirty="0" smtClean="0">
-                <a:latin typeface="Consolas" pitchFamily="49" charset="0"/>
-                <a:cs typeface="Consolas" pitchFamily="49" charset="0"/>
-              </a:rPr>
-              <a:t>);</a:t>
+              <a:t> ( _CRTDBG_ALLOC_MEM_DF | 			_CRTDBG_LEAK_CHECK_DF );</a:t>
             </a:r>
           </a:p>
           <a:p>
@@ -4086,13 +4045,7 @@
               <a:rPr lang="en-US" dirty="0" smtClean="0">
                 <a:hlinkClick r:id="rId2"/>
               </a:rPr>
-              <a:t>http://</a:t>
-            </a:r>
-            <a:r>
-              <a:rPr lang="en-US" dirty="0" smtClean="0">
-                <a:hlinkClick r:id="rId2"/>
-              </a:rPr>
-              <a:t>msdn.microsoft.com/en-us/library/x98tx3cf%28v=vs.90%29.aspx</a:t>
+              <a:t>http://msdn.microsoft.com/en-us/library/x98tx3cf%28v=vs.90%29.aspx</a:t>
             </a:r>
             <a:endParaRPr lang="en-US" dirty="0" smtClean="0"/>
           </a:p>
@@ -4317,6 +4270,80 @@
           </a:p>
         </p:txBody>
       </p:sp>
+      <p:sp>
+        <p:nvSpPr>
+          <p:cNvPr id="4" name="Прямоугольник 5"/>
+          <p:cNvSpPr/>
+          <p:nvPr/>
+        </p:nvSpPr>
+        <p:spPr>
+          <a:xfrm>
+            <a:off x="1676400" y="6096000"/>
+            <a:ext cx="7162800" cy="369332"/>
+          </a:xfrm>
+          <a:prstGeom prst="rect">
+            <a:avLst/>
+          </a:prstGeom>
+        </p:spPr>
+        <p:txBody>
+          <a:bodyPr wrap="square">
+            <a:spAutoFit/>
+          </a:bodyPr>
+          <a:lstStyle/>
+          <a:p>
+            <a:pPr algn="r"/>
+            <a:r>
+              <a:rPr lang="en-US" smtClean="0">
+                <a:hlinkClick r:id="rId2"/>
+              </a:rPr>
+              <a:t>http://</a:t>
+            </a:r>
+            <a:r>
+              <a:rPr lang="en-US" smtClean="0">
+                <a:hlinkClick r:id="rId2"/>
+              </a:rPr>
+              <a:t>habrahabr.ru/post/82514</a:t>
+            </a:r>
+            <a:r>
+              <a:rPr lang="en-US" smtClean="0">
+                <a:hlinkClick r:id="rId2"/>
+              </a:rPr>
+              <a:t>/</a:t>
+            </a:r>
+            <a:endParaRPr lang="en-US" dirty="0" smtClean="0"/>
+          </a:p>
+        </p:txBody>
+      </p:sp>
+      <p:cxnSp>
+        <p:nvCxnSpPr>
+          <p:cNvPr id="5" name="Прямая соединительная линия 6"/>
+          <p:cNvCxnSpPr/>
+          <p:nvPr/>
+        </p:nvCxnSpPr>
+        <p:spPr>
+          <a:xfrm>
+            <a:off x="3581400" y="6019800"/>
+            <a:ext cx="5181600" cy="0"/>
+          </a:xfrm>
+          <a:prstGeom prst="line">
+            <a:avLst/>
+          </a:prstGeom>
+        </p:spPr>
+        <p:style>
+          <a:lnRef idx="1">
+            <a:schemeClr val="accent1"/>
+          </a:lnRef>
+          <a:fillRef idx="0">
+            <a:schemeClr val="accent1"/>
+          </a:fillRef>
+          <a:effectRef idx="0">
+            <a:schemeClr val="accent1"/>
+          </a:effectRef>
+          <a:fontRef idx="minor">
+            <a:schemeClr val="tx1"/>
+          </a:fontRef>
+        </p:style>
+      </p:cxnSp>
     </p:spTree>
   </p:cSld>
   <p:clrMapOvr>
@@ -4488,13 +4515,7 @@
               <a:rPr lang="en-US" dirty="0" smtClean="0">
                 <a:hlinkClick r:id="rId2"/>
               </a:rPr>
-              <a:t>https://vld.codeplex.com</a:t>
-            </a:r>
-            <a:r>
-              <a:rPr lang="en-US" dirty="0" smtClean="0">
-                <a:hlinkClick r:id="rId2"/>
-              </a:rPr>
-              <a:t>/</a:t>
+              <a:t>https://vld.codeplex.com/</a:t>
             </a:r>
             <a:endParaRPr lang="en-US" dirty="0" smtClean="0"/>
           </a:p>
@@ -4607,11 +4628,7 @@
             </a:pPr>
             <a:r>
               <a:rPr lang="en-US" dirty="0" smtClean="0"/>
-              <a:t>#include </a:t>
-            </a:r>
-            <a:r>
-              <a:rPr lang="en-US" dirty="0" smtClean="0"/>
-              <a:t>"</a:t>
+              <a:t>#include "</a:t>
             </a:r>
             <a:r>
               <a:rPr lang="en-US" dirty="0" err="1" smtClean="0"/>
@@ -4782,9 +4799,9 @@
             </a:r>
             <a:r>
               <a:rPr lang="en-US" smtClean="0"/>
-              <a:t>MSVC.</a:t>
-            </a:r>
-            <a:endParaRPr lang="en-US"/>
+              <a:t>MSVC*</a:t>
+            </a:r>
+            <a:endParaRPr lang="en-US" dirty="0"/>
           </a:p>
         </p:txBody>
       </p:sp>

</xml_diff>

<commit_message>
adding image of Fredy Merkury to 7 lection pptx
</commit_message>
<xml_diff>
--- a/lections/cpp_craft_lec_7_pre.pptx
+++ b/lections/cpp_craft_lec_7_pre.pptx
@@ -1033,10 +1033,24 @@
     <dgm:pt modelId="{DA504411-9599-474D-8F98-CB160A4B3A8E}" type="pres">
       <dgm:prSet presAssocID="{9087FC1C-BB16-4F26-8CE5-8CA132C96235}" presName="sibTrans" presStyleLbl="sibTrans2D1" presStyleIdx="0" presStyleCnt="2"/>
       <dgm:spPr/>
+      <dgm:t>
+        <a:bodyPr/>
+        <a:lstStyle/>
+        <a:p>
+          <a:endParaRPr lang="en-US"/>
+        </a:p>
+      </dgm:t>
     </dgm:pt>
     <dgm:pt modelId="{B1FD2CC7-3CE8-44B8-BA0D-B8FE8C45F11A}" type="pres">
       <dgm:prSet presAssocID="{9087FC1C-BB16-4F26-8CE5-8CA132C96235}" presName="connectorText" presStyleLbl="sibTrans2D1" presStyleIdx="0" presStyleCnt="2"/>
       <dgm:spPr/>
+      <dgm:t>
+        <a:bodyPr/>
+        <a:lstStyle/>
+        <a:p>
+          <a:endParaRPr lang="en-US"/>
+        </a:p>
+      </dgm:t>
     </dgm:pt>
     <dgm:pt modelId="{42C663FA-7FD7-4D4F-9E02-08EC6D155169}" type="pres">
       <dgm:prSet presAssocID="{5F3138D7-7F85-4D6A-B320-E3EBE82BFAC7}" presName="node" presStyleLbl="node1" presStyleIdx="1" presStyleCnt="3">
@@ -1045,14 +1059,35 @@
         </dgm:presLayoutVars>
       </dgm:prSet>
       <dgm:spPr/>
+      <dgm:t>
+        <a:bodyPr/>
+        <a:lstStyle/>
+        <a:p>
+          <a:endParaRPr lang="en-US"/>
+        </a:p>
+      </dgm:t>
     </dgm:pt>
     <dgm:pt modelId="{BBEBD797-B207-4F9D-8967-905511009618}" type="pres">
       <dgm:prSet presAssocID="{9CC1FAC1-E4E3-4B56-9FA6-3E86E71E6C32}" presName="sibTrans" presStyleLbl="sibTrans2D1" presStyleIdx="1" presStyleCnt="2"/>
       <dgm:spPr/>
+      <dgm:t>
+        <a:bodyPr/>
+        <a:lstStyle/>
+        <a:p>
+          <a:endParaRPr lang="en-US"/>
+        </a:p>
+      </dgm:t>
     </dgm:pt>
     <dgm:pt modelId="{4F556CF0-EFC0-449D-8B0E-92DE6AE66994}" type="pres">
       <dgm:prSet presAssocID="{9CC1FAC1-E4E3-4B56-9FA6-3E86E71E6C32}" presName="connectorText" presStyleLbl="sibTrans2D1" presStyleIdx="1" presStyleCnt="2"/>
       <dgm:spPr/>
+      <dgm:t>
+        <a:bodyPr/>
+        <a:lstStyle/>
+        <a:p>
+          <a:endParaRPr lang="en-US"/>
+        </a:p>
+      </dgm:t>
     </dgm:pt>
     <dgm:pt modelId="{B344D312-9AFE-47F6-80A6-9363426B471F}" type="pres">
       <dgm:prSet presAssocID="{BAAA0CFD-6E35-4AA1-9193-B9FB1C3DF752}" presName="node" presStyleLbl="node1" presStyleIdx="2" presStyleCnt="3" custScaleX="217000">
@@ -2753,7 +2788,7 @@
             <a:fld id="{9D2A6E17-AB36-4E53-A896-72D500841CBD}" type="datetimeFigureOut">
               <a:rPr lang="en-US" smtClean="0"/>
               <a:pPr/>
-              <a:t>11/15/2013</a:t>
+              <a:t>11/19/2013</a:t>
             </a:fld>
             <a:endParaRPr lang="en-US"/>
           </a:p>
@@ -2915,7 +2950,7 @@
             <a:fld id="{51355148-98C8-44B7-B615-545A12FD2603}" type="datetimeFigureOut">
               <a:rPr lang="en-US" smtClean="0"/>
               <a:pPr/>
-              <a:t>11/15/2013</a:t>
+              <a:t>11/19/2013</a:t>
             </a:fld>
             <a:endParaRPr lang="en-US"/>
           </a:p>
@@ -3084,7 +3119,7 @@
     </p:spTree>
     <p:extLst>
       <p:ext uri="{BB962C8B-B14F-4D97-AF65-F5344CB8AC3E}">
-        <p14:creationId xmlns:p14="http://schemas.microsoft.com/office/powerpoint/2010/main" xmlns="" val="402960394"/>
+        <p14:creationId xmlns="" xmlns:p14="http://schemas.microsoft.com/office/powerpoint/2010/main" val="402960394"/>
       </p:ext>
     </p:extLst>
   </p:cSld>
@@ -3262,7 +3297,7 @@
     </p:spTree>
     <p:extLst>
       <p:ext uri="{BB962C8B-B14F-4D97-AF65-F5344CB8AC3E}">
-        <p14:creationId xmlns:p14="http://schemas.microsoft.com/office/powerpoint/2010/main" xmlns="" val="1596205665"/>
+        <p14:creationId xmlns="" xmlns:p14="http://schemas.microsoft.com/office/powerpoint/2010/main" val="1596205665"/>
       </p:ext>
     </p:extLst>
   </p:cSld>
@@ -3454,7 +3489,7 @@
             <a:fld id="{617A4F30-FB30-424F-9F07-D851740F429F}" type="datetimeFigureOut">
               <a:rPr lang="en-US" smtClean="0"/>
               <a:pPr/>
-              <a:t>11/15/2013</a:t>
+              <a:t>11/19/2013</a:t>
             </a:fld>
             <a:endParaRPr lang="en-US"/>
           </a:p>
@@ -3621,7 +3656,7 @@
             <a:fld id="{617A4F30-FB30-424F-9F07-D851740F429F}" type="datetimeFigureOut">
               <a:rPr lang="en-US" smtClean="0"/>
               <a:pPr/>
-              <a:t>11/15/2013</a:t>
+              <a:t>11/19/2013</a:t>
             </a:fld>
             <a:endParaRPr lang="en-US"/>
           </a:p>
@@ -3798,7 +3833,7 @@
             <a:fld id="{617A4F30-FB30-424F-9F07-D851740F429F}" type="datetimeFigureOut">
               <a:rPr lang="en-US" smtClean="0"/>
               <a:pPr/>
-              <a:t>11/15/2013</a:t>
+              <a:t>11/19/2013</a:t>
             </a:fld>
             <a:endParaRPr lang="en-US"/>
           </a:p>
@@ -3965,7 +4000,7 @@
             <a:fld id="{617A4F30-FB30-424F-9F07-D851740F429F}" type="datetimeFigureOut">
               <a:rPr lang="en-US" smtClean="0"/>
               <a:pPr/>
-              <a:t>11/15/2013</a:t>
+              <a:t>11/19/2013</a:t>
             </a:fld>
             <a:endParaRPr lang="en-US"/>
           </a:p>
@@ -4208,7 +4243,7 @@
             <a:fld id="{617A4F30-FB30-424F-9F07-D851740F429F}" type="datetimeFigureOut">
               <a:rPr lang="en-US" smtClean="0"/>
               <a:pPr/>
-              <a:t>11/15/2013</a:t>
+              <a:t>11/19/2013</a:t>
             </a:fld>
             <a:endParaRPr lang="en-US"/>
           </a:p>
@@ -4493,7 +4528,7 @@
             <a:fld id="{617A4F30-FB30-424F-9F07-D851740F429F}" type="datetimeFigureOut">
               <a:rPr lang="en-US" smtClean="0"/>
               <a:pPr/>
-              <a:t>11/15/2013</a:t>
+              <a:t>11/19/2013</a:t>
             </a:fld>
             <a:endParaRPr lang="en-US"/>
           </a:p>
@@ -4912,7 +4947,7 @@
             <a:fld id="{617A4F30-FB30-424F-9F07-D851740F429F}" type="datetimeFigureOut">
               <a:rPr lang="en-US" smtClean="0"/>
               <a:pPr/>
-              <a:t>11/15/2013</a:t>
+              <a:t>11/19/2013</a:t>
             </a:fld>
             <a:endParaRPr lang="en-US"/>
           </a:p>
@@ -5027,7 +5062,7 @@
             <a:fld id="{617A4F30-FB30-424F-9F07-D851740F429F}" type="datetimeFigureOut">
               <a:rPr lang="en-US" smtClean="0"/>
               <a:pPr/>
-              <a:t>11/15/2013</a:t>
+              <a:t>11/19/2013</a:t>
             </a:fld>
             <a:endParaRPr lang="en-US"/>
           </a:p>
@@ -5119,7 +5154,7 @@
             <a:fld id="{617A4F30-FB30-424F-9F07-D851740F429F}" type="datetimeFigureOut">
               <a:rPr lang="en-US" smtClean="0"/>
               <a:pPr/>
-              <a:t>11/15/2013</a:t>
+              <a:t>11/19/2013</a:t>
             </a:fld>
             <a:endParaRPr lang="en-US"/>
           </a:p>
@@ -5393,7 +5428,7 @@
             <a:fld id="{617A4F30-FB30-424F-9F07-D851740F429F}" type="datetimeFigureOut">
               <a:rPr lang="en-US" smtClean="0"/>
               <a:pPr/>
-              <a:t>11/15/2013</a:t>
+              <a:t>11/19/2013</a:t>
             </a:fld>
             <a:endParaRPr lang="en-US"/>
           </a:p>
@@ -5643,7 +5678,7 @@
             <a:fld id="{617A4F30-FB30-424F-9F07-D851740F429F}" type="datetimeFigureOut">
               <a:rPr lang="en-US" smtClean="0"/>
               <a:pPr/>
-              <a:t>11/15/2013</a:t>
+              <a:t>11/19/2013</a:t>
             </a:fld>
             <a:endParaRPr lang="en-US"/>
           </a:p>
@@ -5853,7 +5888,7 @@
             <a:fld id="{617A4F30-FB30-424F-9F07-D851740F429F}" type="datetimeFigureOut">
               <a:rPr lang="en-US" smtClean="0"/>
               <a:pPr/>
-              <a:t>11/15/2013</a:t>
+              <a:t>11/19/2013</a:t>
             </a:fld>
             <a:endParaRPr lang="en-US"/>
           </a:p>
@@ -6279,7 +6314,6 @@
               <a:rPr lang="ru-RU" dirty="0" smtClean="0"/>
               <a:t>Подсистемы серверных приложений</a:t>
             </a:r>
-            <a:endParaRPr lang="ru-RU" dirty="0" smtClean="0"/>
           </a:p>
           <a:p>
             <a:r>
@@ -6406,11 +6440,7 @@
             </a:r>
             <a:r>
               <a:rPr lang="en-US" sz="1600" dirty="0" smtClean="0"/>
-              <a:t> </a:t>
-            </a:r>
-            <a:r>
-              <a:rPr lang="en-US" sz="1600" dirty="0" smtClean="0"/>
-              <a:t>--tool=</a:t>
+              <a:t> --tool=</a:t>
             </a:r>
             <a:r>
               <a:rPr lang="en-US" sz="1600" dirty="0" err="1" smtClean="0"/>
@@ -6418,11 +6448,7 @@
             </a:r>
             <a:r>
               <a:rPr lang="en-US" sz="1600" dirty="0" smtClean="0"/>
-              <a:t> --leak-check=full ./</a:t>
-            </a:r>
-            <a:r>
-              <a:rPr lang="en-US" sz="1600" dirty="0" smtClean="0"/>
-              <a:t>bin_32/Debug/</a:t>
+              <a:t> --leak-check=full ./bin_32/Debug/</a:t>
             </a:r>
             <a:r>
               <a:rPr lang="en-US" sz="1600" dirty="0" err="1" smtClean="0"/>
@@ -6445,14 +6471,7 @@
                 <a:latin typeface="Consolas" pitchFamily="49" charset="0"/>
                 <a:cs typeface="Consolas" pitchFamily="49" charset="0"/>
               </a:rPr>
-              <a:t>==</a:t>
-            </a:r>
-            <a:r>
-              <a:rPr lang="en-US" sz="1400" dirty="0" smtClean="0">
-                <a:latin typeface="Consolas" pitchFamily="49" charset="0"/>
-                <a:cs typeface="Consolas" pitchFamily="49" charset="0"/>
-              </a:rPr>
-              <a:t>26393== 14 bytes in 1 blocks are definitely lost in loss record 1 of 5</a:t>
+              <a:t>==26393== 14 bytes in 1 blocks are definitely lost in loss record 1 of 5</a:t>
             </a:r>
           </a:p>
           <a:p>
@@ -6846,13 +6865,7 @@
               <a:rPr lang="en-US" dirty="0" smtClean="0">
                 <a:hlinkClick r:id="rId2"/>
               </a:rPr>
-              <a:t>https://</a:t>
-            </a:r>
-            <a:r>
-              <a:rPr lang="en-US" dirty="0" smtClean="0">
-                <a:hlinkClick r:id="rId2"/>
-              </a:rPr>
-              <a:t>github.com/config4star/config4cpp</a:t>
+              <a:t>https://github.com/config4star/config4cpp</a:t>
             </a:r>
             <a:endParaRPr lang="en-US" dirty="0" smtClean="0"/>
           </a:p>
@@ -7083,11 +7096,7 @@
             </a:r>
             <a:r>
               <a:rPr lang="en-US" dirty="0" smtClean="0"/>
-              <a:t>timeout </a:t>
-            </a:r>
-            <a:r>
-              <a:rPr lang="en-US" dirty="0" smtClean="0"/>
-              <a:t>= "5 seconds"; </a:t>
+              <a:t>timeout = "5 seconds"; </a:t>
             </a:r>
             <a:endParaRPr lang="ru-RU" dirty="0" smtClean="0"/>
           </a:p>
@@ -7125,19 +7134,47 @@
             </a:pPr>
             <a:r>
               <a:rPr lang="ru-RU" dirty="0" smtClean="0"/>
-              <a:t>	</a:t>
-            </a:r>
+              <a:t>		</a:t>
+            </a:r>
+            <a:r>
+              <a:rPr lang="en-US" dirty="0" smtClean="0"/>
+              <a:t>level = "2"; </a:t>
+            </a:r>
+            <a:endParaRPr lang="ru-RU" dirty="0" smtClean="0"/>
+          </a:p>
+          <a:p>
+            <a:pPr>
+              <a:buNone/>
+            </a:pPr>
+            <a:r>
+              <a:rPr lang="ru-RU" dirty="0" smtClean="0"/>
+              <a:t>		</a:t>
+            </a:r>
+            <a:r>
+              <a:rPr lang="en-US" dirty="0" smtClean="0"/>
+              <a:t>dir = "/</a:t>
+            </a:r>
+            <a:r>
+              <a:rPr lang="en-US" dirty="0" err="1" smtClean="0"/>
+              <a:t>tmp</a:t>
+            </a:r>
+            <a:r>
+              <a:rPr lang="en-US" dirty="0" smtClean="0"/>
+              <a:t>"; </a:t>
+            </a:r>
+            <a:endParaRPr lang="ru-RU" dirty="0" smtClean="0"/>
+          </a:p>
+          <a:p>
+            <a:pPr>
+              <a:buNone/>
+            </a:pPr>
             <a:r>
               <a:rPr lang="ru-RU" dirty="0" smtClean="0"/>
               <a:t>	</a:t>
             </a:r>
             <a:r>
               <a:rPr lang="en-US" dirty="0" smtClean="0"/>
-              <a:t>level </a:t>
-            </a:r>
-            <a:r>
-              <a:rPr lang="en-US" dirty="0" smtClean="0"/>
-              <a:t>= "2"; </a:t>
+              <a:t>} </a:t>
             </a:r>
             <a:endParaRPr lang="ru-RU" dirty="0" smtClean="0"/>
           </a:p>
@@ -7150,24 +7187,30 @@
               <a:t>	</a:t>
             </a:r>
             <a:r>
+              <a:rPr lang="en-US" dirty="0" err="1" smtClean="0"/>
+              <a:t>colour</a:t>
+            </a:r>
+            <a:r>
+              <a:rPr lang="en-US" dirty="0" smtClean="0"/>
+              <a:t> = "green"; </a:t>
+            </a:r>
+            <a:endParaRPr lang="ru-RU" dirty="0" smtClean="0"/>
+          </a:p>
+          <a:p>
+            <a:pPr>
+              <a:buNone/>
+            </a:pPr>
+            <a:r>
               <a:rPr lang="ru-RU" dirty="0" smtClean="0"/>
               <a:t>	</a:t>
             </a:r>
             <a:r>
-              <a:rPr lang="en-US" dirty="0" smtClean="0"/>
-              <a:t>dir </a:t>
-            </a:r>
-            <a:r>
-              <a:rPr lang="en-US" dirty="0" smtClean="0"/>
-              <a:t>= "/</a:t>
-            </a:r>
-            <a:r>
               <a:rPr lang="en-US" dirty="0" err="1" smtClean="0"/>
-              <a:t>tmp</a:t>
-            </a:r>
-            <a:r>
-              <a:rPr lang="en-US" dirty="0" smtClean="0"/>
-              <a:t>"; </a:t>
+              <a:t>int_list</a:t>
+            </a:r>
+            <a:r>
+              <a:rPr lang="en-US" dirty="0" smtClean="0"/>
+              <a:t> = ["1", "2", "3"]; </a:t>
             </a:r>
             <a:endParaRPr lang="ru-RU" dirty="0" smtClean="0"/>
           </a:p>
@@ -7181,69 +7224,7 @@
             </a:r>
             <a:r>
               <a:rPr lang="en-US" dirty="0" smtClean="0"/>
-              <a:t>} </a:t>
-            </a:r>
-            <a:endParaRPr lang="ru-RU" dirty="0" smtClean="0"/>
-          </a:p>
-          <a:p>
-            <a:pPr>
-              <a:buNone/>
-            </a:pPr>
-            <a:r>
-              <a:rPr lang="ru-RU" dirty="0" smtClean="0"/>
-              <a:t>	</a:t>
-            </a:r>
-            <a:r>
-              <a:rPr lang="en-US" dirty="0" err="1" smtClean="0"/>
-              <a:t>colour</a:t>
-            </a:r>
-            <a:r>
-              <a:rPr lang="en-US" dirty="0" smtClean="0"/>
-              <a:t> </a:t>
-            </a:r>
-            <a:r>
-              <a:rPr lang="en-US" dirty="0" smtClean="0"/>
-              <a:t>= "green"; </a:t>
-            </a:r>
-            <a:endParaRPr lang="ru-RU" dirty="0" smtClean="0"/>
-          </a:p>
-          <a:p>
-            <a:pPr>
-              <a:buNone/>
-            </a:pPr>
-            <a:r>
-              <a:rPr lang="ru-RU" dirty="0" smtClean="0"/>
-              <a:t>	</a:t>
-            </a:r>
-            <a:r>
-              <a:rPr lang="en-US" dirty="0" err="1" smtClean="0"/>
-              <a:t>int_list</a:t>
-            </a:r>
-            <a:r>
-              <a:rPr lang="en-US" dirty="0" smtClean="0"/>
-              <a:t> </a:t>
-            </a:r>
-            <a:r>
-              <a:rPr lang="en-US" dirty="0" smtClean="0"/>
-              <a:t>= ["1", "2", "3"]; </a:t>
-            </a:r>
-            <a:endParaRPr lang="ru-RU" dirty="0" smtClean="0"/>
-          </a:p>
-          <a:p>
-            <a:pPr>
-              <a:buNone/>
-            </a:pPr>
-            <a:r>
-              <a:rPr lang="ru-RU" dirty="0" smtClean="0"/>
-              <a:t>	</a:t>
-            </a:r>
-            <a:r>
-              <a:rPr lang="en-US" dirty="0" smtClean="0"/>
-              <a:t>temperature </a:t>
-            </a:r>
-            <a:r>
-              <a:rPr lang="en-US" dirty="0" smtClean="0"/>
-              <a:t>= "29 C"; </a:t>
+              <a:t>temperature = "29 C"; </a:t>
             </a:r>
             <a:endParaRPr lang="ru-RU" dirty="0" smtClean="0"/>
           </a:p>
@@ -7381,14 +7362,7 @@
                 <a:latin typeface="Consolas" pitchFamily="49" charset="0"/>
                 <a:cs typeface="Consolas" pitchFamily="49" charset="0"/>
               </a:rPr>
-              <a:t>CtaTradeLine.t1.log_file = _</a:t>
-            </a:r>
-            <a:r>
-              <a:rPr lang="en-US" sz="2000" dirty="0" smtClean="0">
-                <a:latin typeface="Consolas" pitchFamily="49" charset="0"/>
-                <a:cs typeface="Consolas" pitchFamily="49" charset="0"/>
-              </a:rPr>
-              <a:t>cta_in_t01.log</a:t>
+              <a:t>CtaTradeLine.t1.log_file = _cta_in_t01.log</a:t>
             </a:r>
           </a:p>
           <a:p>
@@ -7832,14 +7806,7 @@
                 <a:latin typeface="Consolas" pitchFamily="49" charset="0"/>
                 <a:cs typeface="Consolas" pitchFamily="49" charset="0"/>
               </a:rPr>
-              <a:t>[</a:t>
-            </a:r>
-            <a:r>
-              <a:rPr lang="en-US" sz="2000" dirty="0" smtClean="0">
-                <a:latin typeface="Consolas" pitchFamily="49" charset="0"/>
-                <a:cs typeface="Consolas" pitchFamily="49" charset="0"/>
-              </a:rPr>
-              <a:t>2013-Apr-17 14:18:59.228022:NOTE   ]: used default: </a:t>
+              <a:t>[2013-Apr-17 14:18:59.228022:NOTE   ]: used default: </a:t>
             </a:r>
             <a:r>
               <a:rPr lang="en-US" sz="2000" dirty="0" err="1" smtClean="0">
@@ -8188,21 +8155,7 @@
                 <a:latin typeface="Consolas" pitchFamily="49" charset="0"/>
                 <a:cs typeface="Consolas" pitchFamily="49" charset="0"/>
               </a:rPr>
-              <a:t>#</a:t>
-            </a:r>
-            <a:r>
-              <a:rPr lang="en-US" sz="2000" dirty="0" smtClean="0">
-                <a:latin typeface="Consolas" pitchFamily="49" charset="0"/>
-                <a:cs typeface="Consolas" pitchFamily="49" charset="0"/>
-              </a:rPr>
-              <a:t>include </a:t>
-            </a:r>
-            <a:r>
-              <a:rPr lang="en-US" sz="2000" dirty="0" smtClean="0">
-                <a:latin typeface="Consolas" pitchFamily="49" charset="0"/>
-                <a:cs typeface="Consolas" pitchFamily="49" charset="0"/>
-              </a:rPr>
-              <a:t>&lt;</a:t>
+              <a:t>#include &lt;</a:t>
             </a:r>
             <a:r>
               <a:rPr lang="en-US" sz="2000" dirty="0" err="1" smtClean="0">
@@ -9076,11 +9029,7 @@
           <a:p>
             <a:r>
               <a:rPr lang="ru-RU" dirty="0" smtClean="0"/>
-              <a:t>Изменение </a:t>
-            </a:r>
-            <a:r>
-              <a:rPr lang="ru-RU" dirty="0" smtClean="0"/>
-              <a:t>алгоритмов обработки и преобразования</a:t>
+              <a:t>Изменение алгоритмов обработки и преобразования</a:t>
             </a:r>
             <a:endParaRPr lang="en-US" dirty="0" smtClean="0"/>
           </a:p>
@@ -9448,38 +9397,25 @@
             </a:pPr>
             <a:r>
               <a:rPr lang="en-US" dirty="0" smtClean="0"/>
-              <a:t>        while </a:t>
-            </a:r>
-            <a:r>
-              <a:rPr lang="en-US" dirty="0" smtClean="0"/>
-              <a:t>(true)</a:t>
-            </a:r>
-          </a:p>
-          <a:p>
-            <a:pPr>
-              <a:buNone/>
-            </a:pPr>
-            <a:r>
-              <a:rPr lang="en-US" dirty="0" smtClean="0"/>
-              <a:t>     </a:t>
-            </a:r>
-            <a:r>
-              <a:rPr lang="en-US" dirty="0" smtClean="0"/>
-              <a:t>   {</a:t>
-            </a:r>
-            <a:endParaRPr lang="en-US" dirty="0" smtClean="0"/>
-          </a:p>
-          <a:p>
-            <a:pPr>
-              <a:buNone/>
-            </a:pPr>
-            <a:r>
-              <a:rPr lang="en-US" dirty="0" smtClean="0"/>
-              <a:t>                 boost</a:t>
-            </a:r>
-            <a:r>
-              <a:rPr lang="en-US" dirty="0" smtClean="0"/>
-              <a:t>::</a:t>
+              <a:t>        while (true)</a:t>
+            </a:r>
+          </a:p>
+          <a:p>
+            <a:pPr>
+              <a:buNone/>
+            </a:pPr>
+            <a:r>
+              <a:rPr lang="en-US" dirty="0" smtClean="0"/>
+              <a:t>        {</a:t>
+            </a:r>
+          </a:p>
+          <a:p>
+            <a:pPr>
+              <a:buNone/>
+            </a:pPr>
+            <a:r>
+              <a:rPr lang="en-US" dirty="0" smtClean="0"/>
+              <a:t>                 boost::</a:t>
             </a:r>
             <a:r>
               <a:rPr lang="en-US" dirty="0" err="1" smtClean="0"/>
@@ -9512,15 +9448,7 @@
             </a:pPr>
             <a:r>
               <a:rPr lang="en-US" dirty="0" smtClean="0"/>
-              <a:t>	</a:t>
-            </a:r>
-            <a:r>
-              <a:rPr lang="en-US" dirty="0" smtClean="0"/>
-              <a:t>if </a:t>
-            </a:r>
-            <a:r>
-              <a:rPr lang="en-US" dirty="0" smtClean="0"/>
-              <a:t>( !</a:t>
+              <a:t>	if ( !</a:t>
             </a:r>
             <a:r>
               <a:rPr lang="en-US" dirty="0" err="1" smtClean="0"/>
@@ -9537,28 +9465,16 @@
             </a:pPr>
             <a:r>
               <a:rPr lang="en-US" dirty="0" smtClean="0"/>
-              <a:t>	</a:t>
-            </a:r>
-            <a:r>
-              <a:rPr lang="en-US" dirty="0" smtClean="0"/>
-              <a:t>            break</a:t>
-            </a:r>
-            <a:r>
-              <a:rPr lang="en-US" dirty="0" smtClean="0"/>
-              <a:t>;</a:t>
-            </a:r>
-          </a:p>
-          <a:p>
-            <a:pPr>
-              <a:buNone/>
-            </a:pPr>
-            <a:r>
-              <a:rPr lang="en-US" dirty="0" smtClean="0"/>
-              <a:t>	</a:t>
-            </a:r>
-            <a:r>
-              <a:rPr lang="en-US" dirty="0" smtClean="0"/>
-              <a:t>(*</a:t>
+              <a:t>	            break;</a:t>
+            </a:r>
+          </a:p>
+          <a:p>
+            <a:pPr>
+              <a:buNone/>
+            </a:pPr>
+            <a:r>
+              <a:rPr lang="en-US" dirty="0" smtClean="0"/>
+              <a:t>	(*</a:t>
             </a:r>
             <a:r>
               <a:rPr lang="en-US" dirty="0" err="1" smtClean="0"/>
@@ -9575,29 +9491,16 @@
             </a:pPr>
             <a:r>
               <a:rPr lang="en-US" dirty="0" smtClean="0"/>
-              <a:t>	</a:t>
-            </a:r>
-            <a:r>
-              <a:rPr lang="en-US" dirty="0" smtClean="0"/>
-              <a:t>{</a:t>
-            </a:r>
-            <a:endParaRPr lang="en-US" dirty="0" smtClean="0"/>
-          </a:p>
-          <a:p>
-            <a:pPr>
-              <a:buNone/>
-            </a:pPr>
-            <a:r>
-              <a:rPr lang="en-US" dirty="0" smtClean="0"/>
-              <a:t>	 </a:t>
-            </a:r>
-            <a:r>
-              <a:rPr lang="en-US" dirty="0" smtClean="0"/>
-              <a:t>           boost</a:t>
-            </a:r>
-            <a:r>
-              <a:rPr lang="en-US" dirty="0" smtClean="0"/>
-              <a:t>::</a:t>
+              <a:t>	{</a:t>
+            </a:r>
+          </a:p>
+          <a:p>
+            <a:pPr>
+              <a:buNone/>
+            </a:pPr>
+            <a:r>
+              <a:rPr lang="en-US" dirty="0" smtClean="0"/>
+              <a:t>	            boost::</a:t>
             </a:r>
             <a:r>
               <a:rPr lang="en-US" dirty="0" err="1" smtClean="0"/>
@@ -9630,15 +9533,7 @@
             </a:pPr>
             <a:r>
               <a:rPr lang="en-US" dirty="0" smtClean="0"/>
-              <a:t>	</a:t>
-            </a:r>
-            <a:r>
-              <a:rPr lang="en-US" dirty="0" smtClean="0"/>
-              <a:t>            if </a:t>
-            </a:r>
-            <a:r>
-              <a:rPr lang="en-US" dirty="0" smtClean="0"/>
-              <a:t>( </a:t>
+              <a:t>	            if ( </a:t>
             </a:r>
             <a:r>
               <a:rPr lang="en-US" dirty="0" err="1" smtClean="0"/>
@@ -9663,53 +9558,70 @@
             </a:pPr>
             <a:r>
               <a:rPr lang="en-US" dirty="0" smtClean="0"/>
-              <a:t>		</a:t>
-            </a:r>
-            <a:r>
-              <a:rPr lang="en-US" dirty="0" smtClean="0"/>
-              <a:t>       break</a:t>
-            </a:r>
-            <a:r>
-              <a:rPr lang="en-US" dirty="0" smtClean="0"/>
-              <a:t>;</a:t>
-            </a:r>
-          </a:p>
-          <a:p>
-            <a:pPr>
-              <a:buNone/>
-            </a:pPr>
-            <a:r>
-              <a:rPr lang="en-US" dirty="0" smtClean="0"/>
-              <a:t>	</a:t>
-            </a:r>
+              <a:t>		       break;</a:t>
+            </a:r>
+          </a:p>
+          <a:p>
+            <a:pPr>
+              <a:buNone/>
+            </a:pPr>
+            <a:r>
+              <a:rPr lang="en-US" dirty="0" smtClean="0"/>
+              <a:t>	}</a:t>
+            </a:r>
+          </a:p>
+          <a:p>
+            <a:pPr>
+              <a:buNone/>
+            </a:pPr>
+            <a:r>
+              <a:rPr lang="en-US" dirty="0" smtClean="0"/>
+              <a:t>         }</a:t>
+            </a:r>
+          </a:p>
+          <a:p>
+            <a:pPr>
+              <a:buNone/>
+            </a:pPr>
             <a:r>
               <a:rPr lang="en-US" dirty="0" smtClean="0"/>
               <a:t>}</a:t>
             </a:r>
-            <a:endParaRPr lang="en-US" dirty="0" smtClean="0"/>
-          </a:p>
-          <a:p>
-            <a:pPr>
-              <a:buNone/>
-            </a:pPr>
-            <a:r>
-              <a:rPr lang="en-US" dirty="0" smtClean="0"/>
-              <a:t>         }</a:t>
-            </a:r>
-            <a:endParaRPr lang="en-US" dirty="0" smtClean="0"/>
-          </a:p>
-          <a:p>
-            <a:pPr>
-              <a:buNone/>
-            </a:pPr>
-            <a:r>
-              <a:rPr lang="en-US" dirty="0" smtClean="0"/>
-              <a:t>}</a:t>
-            </a:r>
-            <a:endParaRPr lang="en-US" dirty="0" smtClean="0"/>
-          </a:p>
-        </p:txBody>
-      </p:sp>
+          </a:p>
+        </p:txBody>
+      </p:sp>
+      <p:pic>
+        <p:nvPicPr>
+          <p:cNvPr id="1026" name="Picture 2"/>
+          <p:cNvPicPr>
+            <a:picLocks noChangeAspect="1" noChangeArrowheads="1"/>
+          </p:cNvPicPr>
+          <p:nvPr/>
+        </p:nvPicPr>
+        <p:blipFill>
+          <a:blip r:embed="rId2" cstate="print"/>
+          <a:srcRect/>
+          <a:stretch>
+            <a:fillRect/>
+          </a:stretch>
+        </p:blipFill>
+        <p:spPr bwMode="auto">
+          <a:xfrm>
+            <a:off x="6934200" y="1447800"/>
+            <a:ext cx="2019300" cy="2630076"/>
+          </a:xfrm>
+          <a:prstGeom prst="rect">
+            <a:avLst/>
+          </a:prstGeom>
+          <a:noFill/>
+          <a:ln w="9525">
+            <a:noFill/>
+            <a:miter lim="800000"/>
+            <a:headEnd/>
+            <a:tailEnd/>
+          </a:ln>
+        </p:spPr>
+      </p:pic>
     </p:spTree>
   </p:cSld>
   <p:clrMapOvr>
@@ -9846,11 +9758,7 @@
             </a:pPr>
             <a:r>
               <a:rPr lang="en-US" dirty="0" smtClean="0"/>
-              <a:t>boost</a:t>
-            </a:r>
-            <a:r>
-              <a:rPr lang="en-US" dirty="0" smtClean="0"/>
-              <a:t>::</a:t>
+              <a:t>boost::</a:t>
             </a:r>
             <a:r>
               <a:rPr lang="en-US" dirty="0" err="1" smtClean="0"/>
@@ -9881,11 +9789,7 @@
             </a:pPr>
             <a:r>
               <a:rPr lang="en-US" dirty="0" smtClean="0"/>
-              <a:t>for</a:t>
-            </a:r>
-            <a:r>
-              <a:rPr lang="en-US" dirty="0" smtClean="0"/>
-              <a:t>( </a:t>
+              <a:t>for( </a:t>
             </a:r>
             <a:r>
               <a:rPr lang="en-US" dirty="0" err="1" smtClean="0"/>
@@ -9928,7 +9832,6 @@
               <a:rPr lang="en-US" dirty="0" smtClean="0"/>
               <a:t>{</a:t>
             </a:r>
-            <a:endParaRPr lang="en-US" dirty="0" smtClean="0"/>
           </a:p>
           <a:p>
             <a:pPr>
@@ -9940,11 +9843,7 @@
             </a:r>
             <a:r>
               <a:rPr lang="en-US" dirty="0" smtClean="0"/>
-              <a:t>boost</a:t>
-            </a:r>
-            <a:r>
-              <a:rPr lang="en-US" dirty="0" smtClean="0"/>
-              <a:t>::</a:t>
+              <a:t>boost::</a:t>
             </a:r>
             <a:r>
               <a:rPr lang="en-US" dirty="0" err="1" smtClean="0"/>
@@ -9981,11 +9880,7 @@
             </a:r>
             <a:r>
               <a:rPr lang="en-US" dirty="0" err="1" smtClean="0"/>
-              <a:t>working_threads</a:t>
-            </a:r>
-            <a:r>
-              <a:rPr lang="en-US" dirty="0" err="1" smtClean="0"/>
-              <a:t>_.insert</a:t>
+              <a:t>working_threads_.insert</a:t>
             </a:r>
             <a:r>
               <a:rPr lang="en-US" dirty="0" smtClean="0"/>
@@ -10024,19 +9919,11 @@
             </a:pPr>
             <a:r>
               <a:rPr lang="ru-RU" dirty="0" smtClean="0"/>
-              <a:t> </a:t>
-            </a:r>
-            <a:r>
-              <a:rPr lang="ru-RU" dirty="0" smtClean="0"/>
-              <a:t>                 </a:t>
-            </a:r>
-            <a:r>
-              <a:rPr lang="en-US" dirty="0" smtClean="0"/>
-              <a:t>boost</a:t>
-            </a:r>
-            <a:r>
-              <a:rPr lang="en-US" dirty="0" smtClean="0"/>
-              <a:t>::bind( &amp;processor, </a:t>
+              <a:t>                  </a:t>
+            </a:r>
+            <a:r>
+              <a:rPr lang="en-US" dirty="0" smtClean="0"/>
+              <a:t>boost::bind( &amp;processor, </a:t>
             </a:r>
             <a:r>
               <a:rPr lang="en-US" dirty="0" err="1" smtClean="0"/>
@@ -10063,7 +9950,6 @@
               <a:rPr lang="en-US" dirty="0" smtClean="0"/>
               <a:t>}</a:t>
             </a:r>
-            <a:endParaRPr lang="en-US" dirty="0" smtClean="0"/>
           </a:p>
         </p:txBody>
       </p:sp>
@@ -10176,7 +10062,6 @@
               <a:rPr lang="en-US" dirty="0" smtClean="0"/>
               <a:t>{</a:t>
             </a:r>
-            <a:endParaRPr lang="en-US" dirty="0" smtClean="0"/>
           </a:p>
           <a:p>
             <a:pPr>
@@ -10188,11 +10073,7 @@
             </a:r>
             <a:r>
               <a:rPr lang="en-US" dirty="0" smtClean="0"/>
-              <a:t>boost</a:t>
-            </a:r>
-            <a:r>
-              <a:rPr lang="en-US" dirty="0" smtClean="0"/>
-              <a:t>::</a:t>
+              <a:t>boost::</a:t>
             </a:r>
             <a:r>
               <a:rPr lang="en-US" dirty="0" err="1" smtClean="0"/>
@@ -10229,11 +10110,7 @@
             </a:r>
             <a:r>
               <a:rPr lang="en-US" dirty="0" err="1" smtClean="0"/>
-              <a:t>working_threads</a:t>
-            </a:r>
-            <a:r>
-              <a:rPr lang="en-US" dirty="0" err="1" smtClean="0"/>
-              <a:t>_.erase</a:t>
+              <a:t>working_threads_.erase</a:t>
             </a:r>
             <a:r>
               <a:rPr lang="en-US" dirty="0" smtClean="0"/>
@@ -10258,11 +10135,7 @@
             </a:r>
             <a:r>
               <a:rPr lang="en-US" dirty="0" err="1" smtClean="0"/>
-              <a:t>working_threads</a:t>
-            </a:r>
-            <a:r>
-              <a:rPr lang="en-US" dirty="0" err="1" smtClean="0"/>
-              <a:t>_.erase</a:t>
+              <a:t>working_threads_.erase</a:t>
             </a:r>
             <a:r>
               <a:rPr lang="en-US" dirty="0" smtClean="0"/>
@@ -10395,11 +10268,7 @@
             </a:pPr>
             <a:r>
               <a:rPr lang="en-US" dirty="0" smtClean="0"/>
-              <a:t>for</a:t>
-            </a:r>
-            <a:r>
-              <a:rPr lang="en-US" dirty="0" smtClean="0"/>
-              <a:t>( </a:t>
+              <a:t>for( </a:t>
             </a:r>
             <a:r>
               <a:rPr lang="en-US" dirty="0" err="1" smtClean="0"/>
@@ -10431,11 +10300,7 @@
             </a:r>
             <a:r>
               <a:rPr lang="en-US" dirty="0" smtClean="0"/>
-              <a:t> </a:t>
-            </a:r>
-            <a:r>
-              <a:rPr lang="en-US" dirty="0" smtClean="0"/>
-              <a:t>; ++</a:t>
+              <a:t> ; ++</a:t>
             </a:r>
             <a:r>
               <a:rPr lang="en-US" dirty="0" err="1" smtClean="0"/>
@@ -10454,7 +10319,6 @@
               <a:rPr lang="en-US" dirty="0" smtClean="0"/>
               <a:t>{</a:t>
             </a:r>
-            <a:endParaRPr lang="en-US" dirty="0" smtClean="0"/>
           </a:p>
           <a:p>
             <a:pPr>
@@ -10550,7 +10414,6 @@
               <a:rPr lang="en-US" dirty="0" smtClean="0"/>
               <a:t>}</a:t>
             </a:r>
-            <a:endParaRPr lang="en-US" dirty="0" smtClean="0"/>
           </a:p>
           <a:p>
             <a:pPr>
@@ -10583,7 +10446,6 @@
               <a:rPr lang="en-US" dirty="0" smtClean="0"/>
               <a:t>();</a:t>
             </a:r>
-            <a:endParaRPr lang="en-US" dirty="0" smtClean="0"/>
           </a:p>
         </p:txBody>
       </p:sp>
@@ -11259,15 +11121,19 @@
             </a:pPr>
             <a:r>
               <a:rPr lang="en-US" dirty="0" smtClean="0"/>
-              <a:t>#include "</a:t>
+              <a:t>#include </a:t>
+            </a:r>
+            <a:r>
+              <a:rPr lang="ru-RU" dirty="0" smtClean="0"/>
+              <a:t>«</a:t>
             </a:r>
             <a:r>
               <a:rPr lang="en-US" dirty="0" err="1" smtClean="0"/>
               <a:t>vld.h</a:t>
             </a:r>
             <a:r>
-              <a:rPr lang="en-US" dirty="0" smtClean="0"/>
-              <a:t>«</a:t>
+              <a:rPr lang="ru-RU" dirty="0" smtClean="0"/>
+              <a:t>»</a:t>
             </a:r>
             <a:endParaRPr lang="ru-RU" dirty="0" smtClean="0"/>
           </a:p>
@@ -11561,19 +11427,7 @@
               <a:rPr lang="en-US" dirty="0" smtClean="0">
                 <a:hlinkClick r:id="rId3"/>
               </a:rPr>
-              <a:t>http</a:t>
-            </a:r>
-            <a:r>
-              <a:rPr lang="en-US" dirty="0" smtClean="0">
-                <a:hlinkClick r:id="rId3"/>
-              </a:rPr>
-              <a:t>://valgrind.org</a:t>
-            </a:r>
-            <a:r>
-              <a:rPr lang="en-US" dirty="0" smtClean="0">
-                <a:hlinkClick r:id="rId3"/>
-              </a:rPr>
-              <a:t>/</a:t>
+              <a:t>http://valgrind.org/</a:t>
             </a:r>
             <a:endParaRPr lang="en-US" dirty="0" smtClean="0"/>
           </a:p>
@@ -11758,13 +11612,7 @@
               <a:rPr lang="en-US" dirty="0" smtClean="0">
                 <a:hlinkClick r:id="rId2"/>
               </a:rPr>
-              <a:t>http://</a:t>
-            </a:r>
-            <a:r>
-              <a:rPr lang="en-US" dirty="0" smtClean="0">
-                <a:hlinkClick r:id="rId2"/>
-              </a:rPr>
-              <a:t>alexott.net/ru/linux/valgrind/Valgrind.html</a:t>
+              <a:t>http://alexott.net/ru/linux/valgrind/Valgrind.html</a:t>
             </a:r>
             <a:endParaRPr lang="en-US" dirty="0" smtClean="0"/>
           </a:p>
@@ -11887,21 +11735,7 @@
                 <a:latin typeface="Consolas" pitchFamily="49" charset="0"/>
                 <a:cs typeface="Consolas" pitchFamily="49" charset="0"/>
               </a:rPr>
-              <a:t> </a:t>
-            </a:r>
-            <a:r>
-              <a:rPr lang="en-US" sz="2000" dirty="0" smtClean="0">
-                <a:latin typeface="Consolas" pitchFamily="49" charset="0"/>
-                <a:cs typeface="Consolas" pitchFamily="49" charset="0"/>
-              </a:rPr>
-              <a:t>./</a:t>
-            </a:r>
-            <a:r>
-              <a:rPr lang="en-US" sz="2000" dirty="0" smtClean="0">
-                <a:latin typeface="Consolas" pitchFamily="49" charset="0"/>
-                <a:cs typeface="Consolas" pitchFamily="49" charset="0"/>
-              </a:rPr>
-              <a:t>bin_32/Debug/</a:t>
+              <a:t> ./bin_32/Debug/</a:t>
             </a:r>
             <a:r>
               <a:rPr lang="en-US" sz="2000" dirty="0" err="1" smtClean="0">
@@ -11933,14 +11767,7 @@
                 <a:latin typeface="Consolas" pitchFamily="49" charset="0"/>
                 <a:cs typeface="Consolas" pitchFamily="49" charset="0"/>
               </a:rPr>
-              <a:t>==</a:t>
-            </a:r>
-            <a:r>
-              <a:rPr lang="en-US" sz="2000" dirty="0" smtClean="0">
-                <a:latin typeface="Consolas" pitchFamily="49" charset="0"/>
-                <a:cs typeface="Consolas" pitchFamily="49" charset="0"/>
-              </a:rPr>
-              <a:t>26372== LEAK SUMMARY:</a:t>
+              <a:t>==26372== LEAK SUMMARY:</a:t>
             </a:r>
           </a:p>
           <a:p>

</xml_diff>